<commit_message>
Update Progress presentation with latest findings
</commit_message>
<xml_diff>
--- a/Study/Progress.pptx
+++ b/Study/Progress.pptx
@@ -107,13 +107,18 @@
       </a:defRPr>
     </a:lvl9pPr>
   </p:defaultTextStyle>
+  <p:extLst>
+    <p:ext uri="{EFAFB233-063F-42B5-8137-9DF3F51BA10A}">
+      <p15:sldGuideLst xmlns:p15="http://schemas.microsoft.com/office/powerpoint/2012/main"/>
+    </p:ext>
+  </p:extLst>
 </p:presentation>
 </file>
 
 <file path=ppt/revisionInfo.xml><?xml version="1.0" encoding="utf-8"?>
 <p1510:revInfo xmlns:a="http://schemas.openxmlformats.org/drawingml/2006/main" xmlns:r="http://schemas.openxmlformats.org/officeDocument/2006/relationships" xmlns:p1510="http://schemas.microsoft.com/office/powerpoint/2015/10/main">
   <p1510:revLst>
-    <p1510:client id="{B09B55AD-26A1-4AE3-8745-C5A26A481B81}" v="34" dt="2025-11-19T17:36:19.673"/>
+    <p1510:client id="{B09B55AD-26A1-4AE3-8745-C5A26A481B81}" v="37" dt="2025-11-20T21:55:02.825"/>
   </p1510:revLst>
 </p1510:revInfo>
 </file>
@@ -122,8 +127,8 @@
 <pc:chgInfo xmlns:a="http://schemas.openxmlformats.org/drawingml/2006/main" xmlns:r="http://schemas.openxmlformats.org/officeDocument/2006/relationships" xmlns:ac="http://schemas.microsoft.com/office/drawing/2013/main/command" xmlns:pc="http://schemas.microsoft.com/office/powerpoint/2013/main/command">
   <pc:docChgLst>
     <pc:chgData name="Mohammad Mahdi Rastegardoost" userId="f5d36434fc58399d" providerId="LiveId" clId="{65A8DF42-931A-4289-A150-D89B2188382F}"/>
-    <pc:docChg chg="undo custSel addSld delSld modSld">
-      <pc:chgData name="Mohammad Mahdi Rastegardoost" userId="f5d36434fc58399d" providerId="LiveId" clId="{65A8DF42-931A-4289-A150-D89B2188382F}" dt="2025-11-19T17:37:29.658" v="355" actId="20577"/>
+    <pc:docChg chg="undo redo custSel addSld delSld modSld">
+      <pc:chgData name="Mohammad Mahdi Rastegardoost" userId="f5d36434fc58399d" providerId="LiveId" clId="{65A8DF42-931A-4289-A150-D89B2188382F}" dt="2025-11-20T21:55:22.215" v="380" actId="478"/>
       <pc:docMkLst>
         <pc:docMk/>
       </pc:docMkLst>
@@ -388,7 +393,7 @@
         </pc:picChg>
       </pc:sldChg>
       <pc:sldChg chg="addSp delSp modSp add mod">
-        <pc:chgData name="Mohammad Mahdi Rastegardoost" userId="f5d36434fc58399d" providerId="LiveId" clId="{65A8DF42-931A-4289-A150-D89B2188382F}" dt="2025-11-19T17:37:29.658" v="355" actId="20577"/>
+        <pc:chgData name="Mohammad Mahdi Rastegardoost" userId="f5d36434fc58399d" providerId="LiveId" clId="{65A8DF42-931A-4289-A150-D89B2188382F}" dt="2025-11-20T21:55:22.215" v="380" actId="478"/>
         <pc:sldMkLst>
           <pc:docMk/>
           <pc:sldMk cId="4196977327" sldId="259"/>
@@ -417,6 +422,14 @@
             <ac:spMk id="18" creationId="{9AA1DF48-AB39-AB5D-8B10-02BB2883E9D2}"/>
           </ac:spMkLst>
         </pc:spChg>
+        <pc:picChg chg="add mod ord">
+          <ac:chgData name="Mohammad Mahdi Rastegardoost" userId="f5d36434fc58399d" providerId="LiveId" clId="{65A8DF42-931A-4289-A150-D89B2188382F}" dt="2025-11-20T21:54:35.722" v="363" actId="167"/>
+          <ac:picMkLst>
+            <pc:docMk/>
+            <pc:sldMk cId="4196977327" sldId="259"/>
+            <ac:picMk id="4" creationId="{85E7F4CA-C9AB-30AE-88BF-AC1FD6B1B675}"/>
+          </ac:picMkLst>
+        </pc:picChg>
         <pc:picChg chg="del">
           <ac:chgData name="Mohammad Mahdi Rastegardoost" userId="f5d36434fc58399d" providerId="LiveId" clId="{65A8DF42-931A-4289-A150-D89B2188382F}" dt="2025-11-19T17:25:52.172" v="297" actId="478"/>
           <ac:picMkLst>
@@ -425,20 +438,28 @@
             <ac:picMk id="4" creationId="{EDEED52A-3FBB-D7EF-0F36-58D91C9F9FE5}"/>
           </ac:picMkLst>
         </pc:picChg>
-        <pc:picChg chg="add mod ord">
-          <ac:chgData name="Mohammad Mahdi Rastegardoost" userId="f5d36434fc58399d" providerId="LiveId" clId="{65A8DF42-931A-4289-A150-D89B2188382F}" dt="2025-11-19T17:25:22.962" v="281" actId="167"/>
+        <pc:picChg chg="add del mod ord">
+          <ac:chgData name="Mohammad Mahdi Rastegardoost" userId="f5d36434fc58399d" providerId="LiveId" clId="{65A8DF42-931A-4289-A150-D89B2188382F}" dt="2025-11-20T21:55:22.215" v="380" actId="478"/>
           <ac:picMkLst>
             <pc:docMk/>
             <pc:sldMk cId="4196977327" sldId="259"/>
             <ac:picMk id="5" creationId="{CECB26A0-AF92-42AB-3509-A30E00D413CE}"/>
           </ac:picMkLst>
         </pc:picChg>
-        <pc:picChg chg="add mod ord">
-          <ac:chgData name="Mohammad Mahdi Rastegardoost" userId="f5d36434fc58399d" providerId="LiveId" clId="{65A8DF42-931A-4289-A150-D89B2188382F}" dt="2025-11-19T17:25:58.670" v="298" actId="1076"/>
+        <pc:picChg chg="add del mod ord">
+          <ac:chgData name="Mohammad Mahdi Rastegardoost" userId="f5d36434fc58399d" providerId="LiveId" clId="{65A8DF42-931A-4289-A150-D89B2188382F}" dt="2025-11-20T21:54:58.537" v="373" actId="478"/>
           <ac:picMkLst>
             <pc:docMk/>
             <pc:sldMk cId="4196977327" sldId="259"/>
             <ac:picMk id="7" creationId="{4FF7B6BF-0B67-5E6C-A9D0-4CDBFF3E6917}"/>
+          </ac:picMkLst>
+        </pc:picChg>
+        <pc:picChg chg="add mod ord">
+          <ac:chgData name="Mohammad Mahdi Rastegardoost" userId="f5d36434fc58399d" providerId="LiveId" clId="{65A8DF42-931A-4289-A150-D89B2188382F}" dt="2025-11-20T21:54:56.442" v="372" actId="167"/>
+          <ac:picMkLst>
+            <pc:docMk/>
+            <pc:sldMk cId="4196977327" sldId="259"/>
+            <ac:picMk id="8" creationId="{405A3145-38C4-4F48-D994-FCB3F26BB352}"/>
           </ac:picMkLst>
         </pc:picChg>
         <pc:picChg chg="del">
@@ -449,8 +470,8 @@
             <ac:picMk id="8" creationId="{9314A385-8B0F-7AE8-FC6B-43A9C23E0A66}"/>
           </ac:picMkLst>
         </pc:picChg>
-        <pc:picChg chg="add mod ord">
-          <ac:chgData name="Mohammad Mahdi Rastegardoost" userId="f5d36434fc58399d" providerId="LiveId" clId="{65A8DF42-931A-4289-A150-D89B2188382F}" dt="2025-11-19T17:25:51.227" v="296" actId="167"/>
+        <pc:picChg chg="add del mod ord">
+          <ac:chgData name="Mohammad Mahdi Rastegardoost" userId="f5d36434fc58399d" providerId="LiveId" clId="{65A8DF42-931A-4289-A150-D89B2188382F}" dt="2025-11-20T21:54:41.190" v="366" actId="478"/>
           <ac:picMkLst>
             <pc:docMk/>
             <pc:sldMk cId="4196977327" sldId="259"/>
@@ -465,6 +486,14 @@
             <ac:picMk id="12" creationId="{93CE01E1-B5D2-1DE6-F5D2-6AF16F96171F}"/>
           </ac:picMkLst>
         </pc:picChg>
+        <pc:picChg chg="add mod ord">
+          <ac:chgData name="Mohammad Mahdi Rastegardoost" userId="f5d36434fc58399d" providerId="LiveId" clId="{65A8DF42-931A-4289-A150-D89B2188382F}" dt="2025-11-20T21:55:20.942" v="379" actId="167"/>
+          <ac:picMkLst>
+            <pc:docMk/>
+            <pc:sldMk cId="4196977327" sldId="259"/>
+            <ac:picMk id="12" creationId="{A582DE53-9ED8-F647-E4E6-0518F93A1B60}"/>
+          </ac:picMkLst>
+        </pc:picChg>
         <pc:picChg chg="add mod">
           <ac:chgData name="Mohammad Mahdi Rastegardoost" userId="f5d36434fc58399d" providerId="LiveId" clId="{65A8DF42-931A-4289-A150-D89B2188382F}" dt="2025-11-19T17:27:36.603" v="316"/>
           <ac:picMkLst>
@@ -474,7 +503,7 @@
           </ac:picMkLst>
         </pc:picChg>
         <pc:cxnChg chg="add mod">
-          <ac:chgData name="Mohammad Mahdi Rastegardoost" userId="f5d36434fc58399d" providerId="LiveId" clId="{65A8DF42-931A-4289-A150-D89B2188382F}" dt="2025-11-19T17:35:15.109" v="345" actId="14100"/>
+          <ac:chgData name="Mohammad Mahdi Rastegardoost" userId="f5d36434fc58399d" providerId="LiveId" clId="{65A8DF42-931A-4289-A150-D89B2188382F}" dt="2025-11-20T21:54:41.190" v="366" actId="478"/>
           <ac:cxnSpMkLst>
             <pc:docMk/>
             <pc:sldMk cId="4196977327" sldId="259"/>
@@ -659,7 +688,7 @@
           <a:p>
             <a:fld id="{9729713E-BAEA-4825-AD9D-6B7A7DA27DCC}" type="datetimeFigureOut">
               <a:rPr lang="en-CA" smtClean="0"/>
-              <a:t>2025-11-19</a:t>
+              <a:t>2025-11-20</a:t>
             </a:fld>
             <a:endParaRPr lang="en-CA"/>
           </a:p>
@@ -859,7 +888,7 @@
           <a:p>
             <a:fld id="{9729713E-BAEA-4825-AD9D-6B7A7DA27DCC}" type="datetimeFigureOut">
               <a:rPr lang="en-CA" smtClean="0"/>
-              <a:t>2025-11-19</a:t>
+              <a:t>2025-11-20</a:t>
             </a:fld>
             <a:endParaRPr lang="en-CA"/>
           </a:p>
@@ -1069,7 +1098,7 @@
           <a:p>
             <a:fld id="{9729713E-BAEA-4825-AD9D-6B7A7DA27DCC}" type="datetimeFigureOut">
               <a:rPr lang="en-CA" smtClean="0"/>
-              <a:t>2025-11-19</a:t>
+              <a:t>2025-11-20</a:t>
             </a:fld>
             <a:endParaRPr lang="en-CA"/>
           </a:p>
@@ -1269,7 +1298,7 @@
           <a:p>
             <a:fld id="{9729713E-BAEA-4825-AD9D-6B7A7DA27DCC}" type="datetimeFigureOut">
               <a:rPr lang="en-CA" smtClean="0"/>
-              <a:t>2025-11-19</a:t>
+              <a:t>2025-11-20</a:t>
             </a:fld>
             <a:endParaRPr lang="en-CA"/>
           </a:p>
@@ -1545,7 +1574,7 @@
           <a:p>
             <a:fld id="{9729713E-BAEA-4825-AD9D-6B7A7DA27DCC}" type="datetimeFigureOut">
               <a:rPr lang="en-CA" smtClean="0"/>
-              <a:t>2025-11-19</a:t>
+              <a:t>2025-11-20</a:t>
             </a:fld>
             <a:endParaRPr lang="en-CA"/>
           </a:p>
@@ -1813,7 +1842,7 @@
           <a:p>
             <a:fld id="{9729713E-BAEA-4825-AD9D-6B7A7DA27DCC}" type="datetimeFigureOut">
               <a:rPr lang="en-CA" smtClean="0"/>
-              <a:t>2025-11-19</a:t>
+              <a:t>2025-11-20</a:t>
             </a:fld>
             <a:endParaRPr lang="en-CA"/>
           </a:p>
@@ -2228,7 +2257,7 @@
           <a:p>
             <a:fld id="{9729713E-BAEA-4825-AD9D-6B7A7DA27DCC}" type="datetimeFigureOut">
               <a:rPr lang="en-CA" smtClean="0"/>
-              <a:t>2025-11-19</a:t>
+              <a:t>2025-11-20</a:t>
             </a:fld>
             <a:endParaRPr lang="en-CA"/>
           </a:p>
@@ -2370,7 +2399,7 @@
           <a:p>
             <a:fld id="{9729713E-BAEA-4825-AD9D-6B7A7DA27DCC}" type="datetimeFigureOut">
               <a:rPr lang="en-CA" smtClean="0"/>
-              <a:t>2025-11-19</a:t>
+              <a:t>2025-11-20</a:t>
             </a:fld>
             <a:endParaRPr lang="en-CA"/>
           </a:p>
@@ -2483,7 +2512,7 @@
           <a:p>
             <a:fld id="{9729713E-BAEA-4825-AD9D-6B7A7DA27DCC}" type="datetimeFigureOut">
               <a:rPr lang="en-CA" smtClean="0"/>
-              <a:t>2025-11-19</a:t>
+              <a:t>2025-11-20</a:t>
             </a:fld>
             <a:endParaRPr lang="en-CA"/>
           </a:p>
@@ -2796,7 +2825,7 @@
           <a:p>
             <a:fld id="{9729713E-BAEA-4825-AD9D-6B7A7DA27DCC}" type="datetimeFigureOut">
               <a:rPr lang="en-CA" smtClean="0"/>
-              <a:t>2025-11-19</a:t>
+              <a:t>2025-11-20</a:t>
             </a:fld>
             <a:endParaRPr lang="en-CA"/>
           </a:p>
@@ -3085,7 +3114,7 @@
           <a:p>
             <a:fld id="{9729713E-BAEA-4825-AD9D-6B7A7DA27DCC}" type="datetimeFigureOut">
               <a:rPr lang="en-CA" smtClean="0"/>
-              <a:t>2025-11-19</a:t>
+              <a:t>2025-11-20</a:t>
             </a:fld>
             <a:endParaRPr lang="en-CA"/>
           </a:p>
@@ -3328,7 +3357,7 @@
           <a:p>
             <a:fld id="{9729713E-BAEA-4825-AD9D-6B7A7DA27DCC}" type="datetimeFigureOut">
               <a:rPr lang="en-CA" smtClean="0"/>
-              <a:t>2025-11-19</a:t>
+              <a:t>2025-11-20</a:t>
             </a:fld>
             <a:endParaRPr lang="en-CA"/>
           </a:p>
@@ -4751,10 +4780,10 @@
       </p:grpSpPr>
       <p:pic>
         <p:nvPicPr>
-          <p:cNvPr id="11" name="Picture 10" descr="A graph of a function&#10;&#10;AI-generated content may be incorrect.">
-            <a:extLst>
-              <a:ext uri="{FF2B5EF4-FFF2-40B4-BE49-F238E27FC236}">
-                <a16:creationId xmlns:a16="http://schemas.microsoft.com/office/drawing/2014/main" id="{B92FD1F2-2F0F-1635-D041-DB2F72FACDA6}"/>
+          <p:cNvPr id="12" name="Picture 11" descr="A diagram of a number of boxes&#10;&#10;AI-generated content may be incorrect.">
+            <a:extLst>
+              <a:ext uri="{FF2B5EF4-FFF2-40B4-BE49-F238E27FC236}">
+                <a16:creationId xmlns:a16="http://schemas.microsoft.com/office/drawing/2014/main" id="{A582DE53-9ED8-F647-E4E6-0518F93A1B60}"/>
               </a:ext>
             </a:extLst>
           </p:cNvPr>
@@ -4777,8 +4806,8 @@
         </p:blipFill>
         <p:spPr>
           <a:xfrm>
-            <a:off x="4084319" y="2687781"/>
-            <a:ext cx="4023360" cy="2672333"/>
+            <a:off x="8168640" y="2805649"/>
+            <a:ext cx="4023360" cy="2396116"/>
           </a:xfrm>
           <a:prstGeom prst="rect">
             <a:avLst/>
@@ -4787,10 +4816,10 @@
       </p:pic>
       <p:pic>
         <p:nvPicPr>
-          <p:cNvPr id="7" name="Picture 6" descr="A group of graphs with different colored dots&#10;&#10;AI-generated content may be incorrect.">
-            <a:extLst>
-              <a:ext uri="{FF2B5EF4-FFF2-40B4-BE49-F238E27FC236}">
-                <a16:creationId xmlns:a16="http://schemas.microsoft.com/office/drawing/2014/main" id="{4FF7B6BF-0B67-5E6C-A9D0-4CDBFF3E6917}"/>
+          <p:cNvPr id="8" name="Picture 7" descr="A group of graphs with different colored dots&#10;&#10;AI-generated content may be incorrect.">
+            <a:extLst>
+              <a:ext uri="{FF2B5EF4-FFF2-40B4-BE49-F238E27FC236}">
+                <a16:creationId xmlns:a16="http://schemas.microsoft.com/office/drawing/2014/main" id="{405A3145-38C4-4F48-D994-FCB3F26BB352}"/>
               </a:ext>
             </a:extLst>
           </p:cNvPr>
@@ -4823,10 +4852,10 @@
       </p:pic>
       <p:pic>
         <p:nvPicPr>
-          <p:cNvPr id="5" name="Picture 4" descr="A diagram of a graph&#10;&#10;AI-generated content may be incorrect.">
-            <a:extLst>
-              <a:ext uri="{FF2B5EF4-FFF2-40B4-BE49-F238E27FC236}">
-                <a16:creationId xmlns:a16="http://schemas.microsoft.com/office/drawing/2014/main" id="{CECB26A0-AF92-42AB-3509-A30E00D413CE}"/>
+          <p:cNvPr id="4" name="Picture 3" descr="A group of graphs with different colored lines&#10;&#10;AI-generated content may be incorrect.">
+            <a:extLst>
+              <a:ext uri="{FF2B5EF4-FFF2-40B4-BE49-F238E27FC236}">
+                <a16:creationId xmlns:a16="http://schemas.microsoft.com/office/drawing/2014/main" id="{85E7F4CA-C9AB-30AE-88BF-AC1FD6B1B675}"/>
               </a:ext>
             </a:extLst>
           </p:cNvPr>
@@ -4849,8 +4878,8 @@
         </p:blipFill>
         <p:spPr>
           <a:xfrm>
-            <a:off x="8168640" y="2805649"/>
-            <a:ext cx="4023360" cy="2396116"/>
+            <a:off x="4084319" y="2687780"/>
+            <a:ext cx="4023360" cy="2672333"/>
           </a:xfrm>
           <a:prstGeom prst="rect">
             <a:avLst/>
@@ -5103,7 +5132,6 @@
           </p:cNvPr>
           <p:cNvCxnSpPr>
             <a:cxnSpLocks/>
-            <a:stCxn id="11" idx="0"/>
             <a:endCxn id="13" idx="1"/>
           </p:cNvCxnSpPr>
           <p:nvPr/>

</xml_diff>

<commit_message>
feat: Add enhanced rheology analysis notebook with true viscosity comparison and error metrics
- Implemented interactive true viscosity input and visualization.
- Developed comprehensive dataset generation with fitting parameters and uncertainties.
- Introduced core functions for stress and strain computation with finite-gap correction.
- Added enhanced plotting function to overlay theoretical viscosity lines on experimental data.
- Created a new function for generating datasets with fitting parameters and error analysis.
- Included detailed markdown documentation for usage and features.
</commit_message>
<xml_diff>
--- a/Study/Progress.pptx
+++ b/Study/Progress.pptx
@@ -7,8 +7,12 @@
   <p:sldIdLst>
     <p:sldId id="256" r:id="rId2"/>
     <p:sldId id="257" r:id="rId3"/>
-    <p:sldId id="258" r:id="rId4"/>
-    <p:sldId id="259" r:id="rId5"/>
+    <p:sldId id="263" r:id="rId4"/>
+    <p:sldId id="258" r:id="rId5"/>
+    <p:sldId id="259" r:id="rId6"/>
+    <p:sldId id="262" r:id="rId7"/>
+    <p:sldId id="260" r:id="rId8"/>
+    <p:sldId id="261" r:id="rId9"/>
   </p:sldIdLst>
   <p:sldSz cx="12192000" cy="6858000"/>
   <p:notesSz cx="6858000" cy="9144000"/>
@@ -118,7 +122,7 @@
 <file path=ppt/revisionInfo.xml><?xml version="1.0" encoding="utf-8"?>
 <p1510:revInfo xmlns:a="http://schemas.openxmlformats.org/drawingml/2006/main" xmlns:r="http://schemas.openxmlformats.org/officeDocument/2006/relationships" xmlns:p1510="http://schemas.microsoft.com/office/powerpoint/2015/10/main">
   <p1510:revLst>
-    <p1510:client id="{B09B55AD-26A1-4AE3-8745-C5A26A481B81}" v="37" dt="2025-11-20T21:55:02.825"/>
+    <p1510:client id="{B09B55AD-26A1-4AE3-8745-C5A26A481B81}" v="43" dt="2025-11-21T21:00:01.724"/>
   </p1510:revLst>
 </p1510:revInfo>
 </file>
@@ -127,8 +131,8 @@
 <pc:chgInfo xmlns:a="http://schemas.openxmlformats.org/drawingml/2006/main" xmlns:r="http://schemas.openxmlformats.org/officeDocument/2006/relationships" xmlns:ac="http://schemas.microsoft.com/office/drawing/2013/main/command" xmlns:pc="http://schemas.microsoft.com/office/powerpoint/2013/main/command">
   <pc:docChgLst>
     <pc:chgData name="Mohammad Mahdi Rastegardoost" userId="f5d36434fc58399d" providerId="LiveId" clId="{65A8DF42-931A-4289-A150-D89B2188382F}"/>
-    <pc:docChg chg="undo redo custSel addSld delSld modSld">
-      <pc:chgData name="Mohammad Mahdi Rastegardoost" userId="f5d36434fc58399d" providerId="LiveId" clId="{65A8DF42-931A-4289-A150-D89B2188382F}" dt="2025-11-20T21:55:22.215" v="380" actId="478"/>
+    <pc:docChg chg="undo redo custSel addSld delSld modSld sldOrd">
+      <pc:chgData name="Mohammad Mahdi Rastegardoost" userId="f5d36434fc58399d" providerId="LiveId" clId="{65A8DF42-931A-4289-A150-D89B2188382F}" dt="2025-11-21T21:01:01.192" v="430" actId="478"/>
       <pc:docMkLst>
         <pc:docMk/>
       </pc:docMkLst>
@@ -154,14 +158,6 @@
             <ac:spMk id="3" creationId="{CF577894-2ADC-587F-5024-12DD12492ED1}"/>
           </ac:spMkLst>
         </pc:spChg>
-        <pc:picChg chg="add del mod">
-          <ac:chgData name="Mohammad Mahdi Rastegardoost" userId="f5d36434fc58399d" providerId="LiveId" clId="{65A8DF42-931A-4289-A150-D89B2188382F}" dt="2025-11-19T17:34:09.967" v="335" actId="478"/>
-          <ac:picMkLst>
-            <pc:docMk/>
-            <pc:sldMk cId="2195099207" sldId="256"/>
-            <ac:picMk id="5" creationId="{3520C711-7E3A-1FC9-7EFA-E9964D436AB5}"/>
-          </ac:picMkLst>
-        </pc:picChg>
         <pc:picChg chg="add mod">
           <ac:chgData name="Mohammad Mahdi Rastegardoost" userId="f5d36434fc58399d" providerId="LiveId" clId="{65A8DF42-931A-4289-A150-D89B2188382F}" dt="2025-11-19T17:26:55.135" v="306" actId="1076"/>
           <ac:picMkLst>
@@ -172,25 +168,17 @@
         </pc:picChg>
       </pc:sldChg>
       <pc:sldChg chg="addSp delSp modSp new mod">
-        <pc:chgData name="Mohammad Mahdi Rastegardoost" userId="f5d36434fc58399d" providerId="LiveId" clId="{65A8DF42-931A-4289-A150-D89B2188382F}" dt="2025-11-19T17:34:43.735" v="338" actId="208"/>
+        <pc:chgData name="Mohammad Mahdi Rastegardoost" userId="f5d36434fc58399d" providerId="LiveId" clId="{65A8DF42-931A-4289-A150-D89B2188382F}" dt="2025-11-21T21:01:01.192" v="430" actId="478"/>
         <pc:sldMkLst>
           <pc:docMk/>
           <pc:sldMk cId="2125011306" sldId="257"/>
         </pc:sldMkLst>
         <pc:spChg chg="mod">
-          <ac:chgData name="Mohammad Mahdi Rastegardoost" userId="f5d36434fc58399d" providerId="LiveId" clId="{65A8DF42-931A-4289-A150-D89B2188382F}" dt="2025-11-19T17:20:53.735" v="109" actId="20577"/>
+          <ac:chgData name="Mohammad Mahdi Rastegardoost" userId="f5d36434fc58399d" providerId="LiveId" clId="{65A8DF42-931A-4289-A150-D89B2188382F}" dt="2025-11-21T20:59:47.985" v="410" actId="20577"/>
           <ac:spMkLst>
             <pc:docMk/>
             <pc:sldMk cId="2125011306" sldId="257"/>
             <ac:spMk id="2" creationId="{5E0056DF-BB73-0CBB-1B4C-7320E10BCA7B}"/>
-          </ac:spMkLst>
-        </pc:spChg>
-        <pc:spChg chg="del">
-          <ac:chgData name="Mohammad Mahdi Rastegardoost" userId="f5d36434fc58399d" providerId="LiveId" clId="{65A8DF42-931A-4289-A150-D89B2188382F}" dt="2025-11-19T17:21:03.031" v="110"/>
-          <ac:spMkLst>
-            <pc:docMk/>
-            <pc:sldMk cId="2125011306" sldId="257"/>
-            <ac:spMk id="3" creationId="{1971FB4B-81F3-6BA5-EAB7-5C3360D79772}"/>
           </ac:spMkLst>
         </pc:spChg>
         <pc:spChg chg="add mod">
@@ -201,6 +189,14 @@
             <ac:spMk id="12" creationId="{6E80B4CB-548D-A97B-9074-275C4E3AC80D}"/>
           </ac:spMkLst>
         </pc:spChg>
+        <pc:spChg chg="add del mod">
+          <ac:chgData name="Mohammad Mahdi Rastegardoost" userId="f5d36434fc58399d" providerId="LiveId" clId="{65A8DF42-931A-4289-A150-D89B2188382F}" dt="2025-11-21T21:00:35.904" v="425" actId="478"/>
+          <ac:spMkLst>
+            <pc:docMk/>
+            <pc:sldMk cId="2125011306" sldId="257"/>
+            <ac:spMk id="18" creationId="{9E23ECA9-61ED-6F5D-AF39-6465876034CC}"/>
+          </ac:spMkLst>
+        </pc:spChg>
         <pc:graphicFrameChg chg="add mod modGraphic">
           <ac:chgData name="Mohammad Mahdi Rastegardoost" userId="f5d36434fc58399d" providerId="LiveId" clId="{65A8DF42-931A-4289-A150-D89B2188382F}" dt="2025-11-19T17:23:52.330" v="248" actId="20577"/>
           <ac:graphicFrameMkLst>
@@ -209,24 +205,40 @@
             <ac:graphicFrameMk id="10" creationId="{652AAD27-98EE-05D8-78B2-ACB6776BD232}"/>
           </ac:graphicFrameMkLst>
         </pc:graphicFrameChg>
-        <pc:picChg chg="add mod">
-          <ac:chgData name="Mohammad Mahdi Rastegardoost" userId="f5d36434fc58399d" providerId="LiveId" clId="{65A8DF42-931A-4289-A150-D89B2188382F}" dt="2025-11-19T17:22:00.079" v="132" actId="1076"/>
+        <pc:picChg chg="add mod ord">
+          <ac:chgData name="Mohammad Mahdi Rastegardoost" userId="f5d36434fc58399d" providerId="LiveId" clId="{65A8DF42-931A-4289-A150-D89B2188382F}" dt="2025-11-21T20:41:52.989" v="397" actId="14100"/>
+          <ac:picMkLst>
+            <pc:docMk/>
+            <pc:sldMk cId="2125011306" sldId="257"/>
+            <ac:picMk id="3" creationId="{ED28A696-5168-9E09-2F29-888F3BD90146}"/>
+          </ac:picMkLst>
+        </pc:picChg>
+        <pc:picChg chg="add del mod">
+          <ac:chgData name="Mohammad Mahdi Rastegardoost" userId="f5d36434fc58399d" providerId="LiveId" clId="{65A8DF42-931A-4289-A150-D89B2188382F}" dt="2025-11-21T21:00:32.561" v="424" actId="478"/>
           <ac:picMkLst>
             <pc:docMk/>
             <pc:sldMk cId="2125011306" sldId="257"/>
             <ac:picMk id="5" creationId="{4662F9F4-A3EC-EE28-9835-78E3A9E58469}"/>
           </ac:picMkLst>
         </pc:picChg>
-        <pc:picChg chg="add mod">
-          <ac:chgData name="Mohammad Mahdi Rastegardoost" userId="f5d36434fc58399d" providerId="LiveId" clId="{65A8DF42-931A-4289-A150-D89B2188382F}" dt="2025-11-19T17:21:58.073" v="131" actId="1076"/>
+        <pc:picChg chg="add mod ord">
+          <ac:chgData name="Mohammad Mahdi Rastegardoost" userId="f5d36434fc58399d" providerId="LiveId" clId="{65A8DF42-931A-4289-A150-D89B2188382F}" dt="2025-11-21T21:00:31.199" v="423" actId="167"/>
+          <ac:picMkLst>
+            <pc:docMk/>
+            <pc:sldMk cId="2125011306" sldId="257"/>
+            <ac:picMk id="6" creationId="{77DD6CE5-15BD-5030-1669-E47F48656C08}"/>
+          </ac:picMkLst>
+        </pc:picChg>
+        <pc:picChg chg="add del mod">
+          <ac:chgData name="Mohammad Mahdi Rastegardoost" userId="f5d36434fc58399d" providerId="LiveId" clId="{65A8DF42-931A-4289-A150-D89B2188382F}" dt="2025-11-21T21:00:54.431" v="428" actId="478"/>
           <ac:picMkLst>
             <pc:docMk/>
             <pc:sldMk cId="2125011306" sldId="257"/>
             <ac:picMk id="7" creationId="{0F351E02-5974-48BC-FF4D-A1CFBDA09788}"/>
           </ac:picMkLst>
         </pc:picChg>
-        <pc:picChg chg="add mod">
-          <ac:chgData name="Mohammad Mahdi Rastegardoost" userId="f5d36434fc58399d" providerId="LiveId" clId="{65A8DF42-931A-4289-A150-D89B2188382F}" dt="2025-11-19T17:21:54.551" v="130" actId="1076"/>
+        <pc:picChg chg="add del mod">
+          <ac:chgData name="Mohammad Mahdi Rastegardoost" userId="f5d36434fc58399d" providerId="LiveId" clId="{65A8DF42-931A-4289-A150-D89B2188382F}" dt="2025-11-21T21:01:01.192" v="430" actId="478"/>
           <ac:picMkLst>
             <pc:docMk/>
             <pc:sldMk cId="2125011306" sldId="257"/>
@@ -241,8 +253,24 @@
             <ac:picMk id="11" creationId="{830ABF0B-D604-7541-B5D8-EFC24FB74EED}"/>
           </ac:picMkLst>
         </pc:picChg>
+        <pc:picChg chg="add mod ord">
+          <ac:chgData name="Mohammad Mahdi Rastegardoost" userId="f5d36434fc58399d" providerId="LiveId" clId="{65A8DF42-931A-4289-A150-D89B2188382F}" dt="2025-11-21T21:00:53.149" v="427" actId="167"/>
+          <ac:picMkLst>
+            <pc:docMk/>
+            <pc:sldMk cId="2125011306" sldId="257"/>
+            <ac:picMk id="13" creationId="{9115A0B2-0A15-AFE2-5BB9-13FBDC850BAA}"/>
+          </ac:picMkLst>
+        </pc:picChg>
+        <pc:picChg chg="add mod ord">
+          <ac:chgData name="Mohammad Mahdi Rastegardoost" userId="f5d36434fc58399d" providerId="LiveId" clId="{65A8DF42-931A-4289-A150-D89B2188382F}" dt="2025-11-21T21:00:59.817" v="429" actId="167"/>
+          <ac:picMkLst>
+            <pc:docMk/>
+            <pc:sldMk cId="2125011306" sldId="257"/>
+            <ac:picMk id="16" creationId="{647931B0-9085-6211-DD5A-DC3C161BF647}"/>
+          </ac:picMkLst>
+        </pc:picChg>
         <pc:cxnChg chg="add mod">
-          <ac:chgData name="Mohammad Mahdi Rastegardoost" userId="f5d36434fc58399d" providerId="LiveId" clId="{65A8DF42-931A-4289-A150-D89B2188382F}" dt="2025-11-19T17:34:43.735" v="338" actId="208"/>
+          <ac:chgData name="Mohammad Mahdi Rastegardoost" userId="f5d36434fc58399d" providerId="LiveId" clId="{65A8DF42-931A-4289-A150-D89B2188382F}" dt="2025-11-21T21:00:54.431" v="428" actId="478"/>
           <ac:cxnSpMkLst>
             <pc:docMk/>
             <pc:sldMk cId="2125011306" sldId="257"/>
@@ -264,14 +292,6 @@
             <ac:spMk id="2" creationId="{9AA264C5-803D-7601-0DD2-7559D967C8E4}"/>
           </ac:spMkLst>
         </pc:spChg>
-        <pc:spChg chg="add del mod">
-          <ac:chgData name="Mohammad Mahdi Rastegardoost" userId="f5d36434fc58399d" providerId="LiveId" clId="{65A8DF42-931A-4289-A150-D89B2188382F}" dt="2025-11-19T17:24:47.524" v="271" actId="478"/>
-          <ac:spMkLst>
-            <pc:docMk/>
-            <pc:sldMk cId="1464339472" sldId="258"/>
-            <ac:spMk id="14" creationId="{1DA18E4E-05AF-551A-4187-70BA75FC2954}"/>
-          </ac:spMkLst>
-        </pc:spChg>
         <pc:spChg chg="add mod">
           <ac:chgData name="Mohammad Mahdi Rastegardoost" userId="f5d36434fc58399d" providerId="LiveId" clId="{65A8DF42-931A-4289-A150-D89B2188382F}" dt="2025-11-19T17:27:27.817" v="315"/>
           <ac:spMkLst>
@@ -288,36 +308,12 @@
             <ac:picMk id="4" creationId="{3A7D6FAC-E9C3-8C1E-51B0-000183F03EBC}"/>
           </ac:picMkLst>
         </pc:picChg>
-        <pc:picChg chg="del">
-          <ac:chgData name="Mohammad Mahdi Rastegardoost" userId="f5d36434fc58399d" providerId="LiveId" clId="{65A8DF42-931A-4289-A150-D89B2188382F}" dt="2025-11-19T17:24:45.375" v="270" actId="478"/>
-          <ac:picMkLst>
-            <pc:docMk/>
-            <pc:sldMk cId="1464339472" sldId="258"/>
-            <ac:picMk id="5" creationId="{45321BF1-74ED-52F8-C69A-48A17AA27E04}"/>
-          </ac:picMkLst>
-        </pc:picChg>
-        <pc:picChg chg="del">
-          <ac:chgData name="Mohammad Mahdi Rastegardoost" userId="f5d36434fc58399d" providerId="LiveId" clId="{65A8DF42-931A-4289-A150-D89B2188382F}" dt="2025-11-19T17:24:15.820" v="256" actId="478"/>
-          <ac:picMkLst>
-            <pc:docMk/>
-            <pc:sldMk cId="1464339472" sldId="258"/>
-            <ac:picMk id="7" creationId="{0E21BBE3-5732-68D2-B5BA-DB345C966EB8}"/>
-          </ac:picMkLst>
-        </pc:picChg>
         <pc:picChg chg="add mod ord">
           <ac:chgData name="Mohammad Mahdi Rastegardoost" userId="f5d36434fc58399d" providerId="LiveId" clId="{65A8DF42-931A-4289-A150-D89B2188382F}" dt="2025-11-19T17:24:26.901" v="262" actId="167"/>
           <ac:picMkLst>
             <pc:docMk/>
             <pc:sldMk cId="1464339472" sldId="258"/>
             <ac:picMk id="8" creationId="{D6C22832-D373-12CA-2F4E-7490BE695651}"/>
-          </ac:picMkLst>
-        </pc:picChg>
-        <pc:picChg chg="del mod">
-          <ac:chgData name="Mohammad Mahdi Rastegardoost" userId="f5d36434fc58399d" providerId="LiveId" clId="{65A8DF42-931A-4289-A150-D89B2188382F}" dt="2025-11-19T17:24:28.113" v="263" actId="478"/>
-          <ac:picMkLst>
-            <pc:docMk/>
-            <pc:sldMk cId="1464339472" sldId="258"/>
-            <ac:picMk id="9" creationId="{F4FA5CE7-E568-E358-2B2D-132EA0C80C6E}"/>
           </ac:picMkLst>
         </pc:picChg>
         <pc:picChg chg="add mod ord">
@@ -337,14 +333,6 @@
           </ac:picMkLst>
         </pc:picChg>
         <pc:cxnChg chg="add mod">
-          <ac:chgData name="Mohammad Mahdi Rastegardoost" userId="f5d36434fc58399d" providerId="LiveId" clId="{65A8DF42-931A-4289-A150-D89B2188382F}" dt="2025-11-19T17:34:49.050" v="339"/>
-          <ac:cxnSpMkLst>
-            <pc:docMk/>
-            <pc:sldMk cId="1464339472" sldId="258"/>
-            <ac:cxnSpMk id="17" creationId="{23C63059-1505-66D3-D7B1-C55D0921747F}"/>
-          </ac:cxnSpMkLst>
-        </pc:cxnChg>
-        <pc:cxnChg chg="add mod">
           <ac:chgData name="Mohammad Mahdi Rastegardoost" userId="f5d36434fc58399d" providerId="LiveId" clId="{65A8DF42-931A-4289-A150-D89B2188382F}" dt="2025-11-19T17:34:56.351" v="342" actId="14100"/>
           <ac:cxnSpMkLst>
             <pc:docMk/>
@@ -352,45 +340,6 @@
             <ac:cxnSpMk id="18" creationId="{7671B063-FDFA-BA72-A88E-2C5D9CA20A61}"/>
           </ac:cxnSpMkLst>
         </pc:cxnChg>
-      </pc:sldChg>
-      <pc:sldChg chg="addSp delSp modSp new del mod">
-        <pc:chgData name="Mohammad Mahdi Rastegardoost" userId="f5d36434fc58399d" providerId="LiveId" clId="{65A8DF42-931A-4289-A150-D89B2188382F}" dt="2025-11-19T17:22:27.816" v="138" actId="680"/>
-        <pc:sldMkLst>
-          <pc:docMk/>
-          <pc:sldMk cId="2606245140" sldId="258"/>
-        </pc:sldMkLst>
-        <pc:spChg chg="add del">
-          <ac:chgData name="Mohammad Mahdi Rastegardoost" userId="f5d36434fc58399d" providerId="LiveId" clId="{65A8DF42-931A-4289-A150-D89B2188382F}" dt="2025-11-19T17:22:27.242" v="137" actId="3680"/>
-          <ac:spMkLst>
-            <pc:docMk/>
-            <pc:sldMk cId="2606245140" sldId="258"/>
-            <ac:spMk id="3" creationId="{F2EB64D6-C30F-F3BE-C245-CF37C51F47CD}"/>
-          </ac:spMkLst>
-        </pc:spChg>
-        <pc:graphicFrameChg chg="add del mod ord modGraphic">
-          <ac:chgData name="Mohammad Mahdi Rastegardoost" userId="f5d36434fc58399d" providerId="LiveId" clId="{65A8DF42-931A-4289-A150-D89B2188382F}" dt="2025-11-19T17:22:27.242" v="137" actId="3680"/>
-          <ac:graphicFrameMkLst>
-            <pc:docMk/>
-            <pc:sldMk cId="2606245140" sldId="258"/>
-            <ac:graphicFrameMk id="4" creationId="{1B0CD3B0-A5B3-E353-15A0-FEAA910727AC}"/>
-          </ac:graphicFrameMkLst>
-        </pc:graphicFrameChg>
-        <pc:picChg chg="add mod">
-          <ac:chgData name="Mohammad Mahdi Rastegardoost" userId="f5d36434fc58399d" providerId="LiveId" clId="{65A8DF42-931A-4289-A150-D89B2188382F}" dt="2025-11-19T17:22:21.961" v="135"/>
-          <ac:picMkLst>
-            <pc:docMk/>
-            <pc:sldMk cId="2606245140" sldId="258"/>
-            <ac:picMk id="5" creationId="{D9ABF0F7-1BB5-83DA-15F0-B70A9609861F}"/>
-          </ac:picMkLst>
-        </pc:picChg>
-        <pc:picChg chg="add mod">
-          <ac:chgData name="Mohammad Mahdi Rastegardoost" userId="f5d36434fc58399d" providerId="LiveId" clId="{65A8DF42-931A-4289-A150-D89B2188382F}" dt="2025-11-19T17:22:23.754" v="136"/>
-          <ac:picMkLst>
-            <pc:docMk/>
-            <pc:sldMk cId="2606245140" sldId="258"/>
-            <ac:picMk id="6" creationId="{F8880984-2BFC-579E-838B-B31804B0FA2C}"/>
-          </ac:picMkLst>
-        </pc:picChg>
       </pc:sldChg>
       <pc:sldChg chg="addSp delSp modSp add mod">
         <pc:chgData name="Mohammad Mahdi Rastegardoost" userId="f5d36434fc58399d" providerId="LiveId" clId="{65A8DF42-931A-4289-A150-D89B2188382F}" dt="2025-11-20T21:55:22.215" v="380" actId="478"/>
@@ -430,14 +379,6 @@
             <ac:picMk id="4" creationId="{85E7F4CA-C9AB-30AE-88BF-AC1FD6B1B675}"/>
           </ac:picMkLst>
         </pc:picChg>
-        <pc:picChg chg="del">
-          <ac:chgData name="Mohammad Mahdi Rastegardoost" userId="f5d36434fc58399d" providerId="LiveId" clId="{65A8DF42-931A-4289-A150-D89B2188382F}" dt="2025-11-19T17:25:52.172" v="297" actId="478"/>
-          <ac:picMkLst>
-            <pc:docMk/>
-            <pc:sldMk cId="4196977327" sldId="259"/>
-            <ac:picMk id="4" creationId="{EDEED52A-3FBB-D7EF-0F36-58D91C9F9FE5}"/>
-          </ac:picMkLst>
-        </pc:picChg>
         <pc:picChg chg="add del mod ord">
           <ac:chgData name="Mohammad Mahdi Rastegardoost" userId="f5d36434fc58399d" providerId="LiveId" clId="{65A8DF42-931A-4289-A150-D89B2188382F}" dt="2025-11-20T21:55:22.215" v="380" actId="478"/>
           <ac:picMkLst>
@@ -462,28 +403,12 @@
             <ac:picMk id="8" creationId="{405A3145-38C4-4F48-D994-FCB3F26BB352}"/>
           </ac:picMkLst>
         </pc:picChg>
-        <pc:picChg chg="del">
-          <ac:chgData name="Mohammad Mahdi Rastegardoost" userId="f5d36434fc58399d" providerId="LiveId" clId="{65A8DF42-931A-4289-A150-D89B2188382F}" dt="2025-11-19T17:25:35.764" v="289" actId="478"/>
-          <ac:picMkLst>
-            <pc:docMk/>
-            <pc:sldMk cId="4196977327" sldId="259"/>
-            <ac:picMk id="8" creationId="{9314A385-8B0F-7AE8-FC6B-43A9C23E0A66}"/>
-          </ac:picMkLst>
-        </pc:picChg>
         <pc:picChg chg="add del mod ord">
           <ac:chgData name="Mohammad Mahdi Rastegardoost" userId="f5d36434fc58399d" providerId="LiveId" clId="{65A8DF42-931A-4289-A150-D89B2188382F}" dt="2025-11-20T21:54:41.190" v="366" actId="478"/>
           <ac:picMkLst>
             <pc:docMk/>
             <pc:sldMk cId="4196977327" sldId="259"/>
             <ac:picMk id="11" creationId="{B92FD1F2-2F0F-1635-D041-DB2F72FACDA6}"/>
-          </ac:picMkLst>
-        </pc:picChg>
-        <pc:picChg chg="del">
-          <ac:chgData name="Mohammad Mahdi Rastegardoost" userId="f5d36434fc58399d" providerId="LiveId" clId="{65A8DF42-931A-4289-A150-D89B2188382F}" dt="2025-11-19T17:25:23.896" v="282" actId="478"/>
-          <ac:picMkLst>
-            <pc:docMk/>
-            <pc:sldMk cId="4196977327" sldId="259"/>
-            <ac:picMk id="12" creationId="{93CE01E1-B5D2-1DE6-F5D2-6AF16F96171F}"/>
           </ac:picMkLst>
         </pc:picChg>
         <pc:picChg chg="add mod ord">
@@ -511,28 +436,73 @@
           </ac:cxnSpMkLst>
         </pc:cxnChg>
       </pc:sldChg>
-      <pc:sldChg chg="addSp delSp modSp new del mod">
-        <pc:chgData name="Mohammad Mahdi Rastegardoost" userId="f5d36434fc58399d" providerId="LiveId" clId="{65A8DF42-931A-4289-A150-D89B2188382F}" dt="2025-11-19T17:37:16.671" v="351" actId="47"/>
+      <pc:sldChg chg="addSp delSp modSp new mod modClrScheme chgLayout">
+        <pc:chgData name="Mohammad Mahdi Rastegardoost" userId="f5d36434fc58399d" providerId="LiveId" clId="{65A8DF42-931A-4289-A150-D89B2188382F}" dt="2025-11-21T20:41:54.806" v="398" actId="21"/>
         <pc:sldMkLst>
           <pc:docMk/>
-          <pc:sldMk cId="2646561125" sldId="260"/>
+          <pc:sldMk cId="1581567201" sldId="260"/>
         </pc:sldMkLst>
-        <pc:spChg chg="add">
-          <ac:chgData name="Mohammad Mahdi Rastegardoost" userId="f5d36434fc58399d" providerId="LiveId" clId="{65A8DF42-931A-4289-A150-D89B2188382F}" dt="2025-11-19T17:33:19.305" v="325"/>
+        <pc:spChg chg="del">
+          <ac:chgData name="Mohammad Mahdi Rastegardoost" userId="f5d36434fc58399d" providerId="LiveId" clId="{65A8DF42-931A-4289-A150-D89B2188382F}" dt="2025-11-21T20:40:58.394" v="382" actId="700"/>
           <ac:spMkLst>
             <pc:docMk/>
-            <pc:sldMk cId="2646561125" sldId="260"/>
-            <ac:spMk id="4" creationId="{9C75E4F0-EF5B-0E0E-DE1C-731D47C78B6E}"/>
+            <pc:sldMk cId="1581567201" sldId="260"/>
+            <ac:spMk id="2" creationId="{04AE4FAF-F0D7-D9EC-817E-3A6ADDF61810}"/>
           </ac:spMkLst>
         </pc:spChg>
-        <pc:picChg chg="add del mod modCrop">
-          <ac:chgData name="Mohammad Mahdi Rastegardoost" userId="f5d36434fc58399d" providerId="LiveId" clId="{65A8DF42-931A-4289-A150-D89B2188382F}" dt="2025-11-19T17:33:34.387" v="329" actId="21"/>
+        <pc:spChg chg="del">
+          <ac:chgData name="Mohammad Mahdi Rastegardoost" userId="f5d36434fc58399d" providerId="LiveId" clId="{65A8DF42-931A-4289-A150-D89B2188382F}" dt="2025-11-21T20:40:58.394" v="382" actId="700"/>
+          <ac:spMkLst>
+            <pc:docMk/>
+            <pc:sldMk cId="1581567201" sldId="260"/>
+            <ac:spMk id="3" creationId="{2949D81D-93D8-2B8C-39DB-80BB6A13068A}"/>
+          </ac:spMkLst>
+        </pc:spChg>
+        <pc:picChg chg="add del mod">
+          <ac:chgData name="Mohammad Mahdi Rastegardoost" userId="f5d36434fc58399d" providerId="LiveId" clId="{65A8DF42-931A-4289-A150-D89B2188382F}" dt="2025-11-21T20:41:54.806" v="398" actId="21"/>
           <ac:picMkLst>
             <pc:docMk/>
-            <pc:sldMk cId="2646561125" sldId="260"/>
-            <ac:picMk id="5" creationId="{3520C711-7E3A-1FC9-7EFA-E9964D436AB5}"/>
+            <pc:sldMk cId="1581567201" sldId="260"/>
+            <ac:picMk id="5" creationId="{ED28A696-5168-9E09-2F29-888F3BD90146}"/>
           </ac:picMkLst>
         </pc:picChg>
+      </pc:sldChg>
+      <pc:sldChg chg="addSp modSp new mod">
+        <pc:chgData name="Mohammad Mahdi Rastegardoost" userId="f5d36434fc58399d" providerId="LiveId" clId="{65A8DF42-931A-4289-A150-D89B2188382F}" dt="2025-11-21T20:44:00.860" v="401" actId="27614"/>
+        <pc:sldMkLst>
+          <pc:docMk/>
+          <pc:sldMk cId="936181188" sldId="261"/>
+        </pc:sldMkLst>
+        <pc:picChg chg="add mod">
+          <ac:chgData name="Mohammad Mahdi Rastegardoost" userId="f5d36434fc58399d" providerId="LiveId" clId="{65A8DF42-931A-4289-A150-D89B2188382F}" dt="2025-11-21T20:44:00.860" v="401" actId="27614"/>
+          <ac:picMkLst>
+            <pc:docMk/>
+            <pc:sldMk cId="936181188" sldId="261"/>
+            <ac:picMk id="3" creationId="{E7E8E9C6-3334-D683-7FEA-A7E6C48B5ACD}"/>
+          </ac:picMkLst>
+        </pc:picChg>
+      </pc:sldChg>
+      <pc:sldChg chg="addSp modSp new mod ord">
+        <pc:chgData name="Mohammad Mahdi Rastegardoost" userId="f5d36434fc58399d" providerId="LiveId" clId="{65A8DF42-931A-4289-A150-D89B2188382F}" dt="2025-11-21T20:52:45.236" v="407"/>
+        <pc:sldMkLst>
+          <pc:docMk/>
+          <pc:sldMk cId="2860284634" sldId="262"/>
+        </pc:sldMkLst>
+        <pc:picChg chg="add mod">
+          <ac:chgData name="Mohammad Mahdi Rastegardoost" userId="f5d36434fc58399d" providerId="LiveId" clId="{65A8DF42-931A-4289-A150-D89B2188382F}" dt="2025-11-21T20:50:48.756" v="405" actId="962"/>
+          <ac:picMkLst>
+            <pc:docMk/>
+            <pc:sldMk cId="2860284634" sldId="262"/>
+            <ac:picMk id="3" creationId="{5B92C276-54C5-E80A-F87D-241D3B27CD77}"/>
+          </ac:picMkLst>
+        </pc:picChg>
+      </pc:sldChg>
+      <pc:sldChg chg="add">
+        <pc:chgData name="Mohammad Mahdi Rastegardoost" userId="f5d36434fc58399d" providerId="LiveId" clId="{65A8DF42-931A-4289-A150-D89B2188382F}" dt="2025-11-21T20:59:44.879" v="408" actId="2890"/>
+        <pc:sldMkLst>
+          <pc:docMk/>
+          <pc:sldMk cId="4206293272" sldId="263"/>
+        </pc:sldMkLst>
       </pc:sldChg>
     </pc:docChg>
   </pc:docChgLst>
@@ -688,7 +658,7 @@
           <a:p>
             <a:fld id="{9729713E-BAEA-4825-AD9D-6B7A7DA27DCC}" type="datetimeFigureOut">
               <a:rPr lang="en-CA" smtClean="0"/>
-              <a:t>2025-11-20</a:t>
+              <a:t>2025-11-21</a:t>
             </a:fld>
             <a:endParaRPr lang="en-CA"/>
           </a:p>
@@ -888,7 +858,7 @@
           <a:p>
             <a:fld id="{9729713E-BAEA-4825-AD9D-6B7A7DA27DCC}" type="datetimeFigureOut">
               <a:rPr lang="en-CA" smtClean="0"/>
-              <a:t>2025-11-20</a:t>
+              <a:t>2025-11-21</a:t>
             </a:fld>
             <a:endParaRPr lang="en-CA"/>
           </a:p>
@@ -1098,7 +1068,7 @@
           <a:p>
             <a:fld id="{9729713E-BAEA-4825-AD9D-6B7A7DA27DCC}" type="datetimeFigureOut">
               <a:rPr lang="en-CA" smtClean="0"/>
-              <a:t>2025-11-20</a:t>
+              <a:t>2025-11-21</a:t>
             </a:fld>
             <a:endParaRPr lang="en-CA"/>
           </a:p>
@@ -1298,7 +1268,7 @@
           <a:p>
             <a:fld id="{9729713E-BAEA-4825-AD9D-6B7A7DA27DCC}" type="datetimeFigureOut">
               <a:rPr lang="en-CA" smtClean="0"/>
-              <a:t>2025-11-20</a:t>
+              <a:t>2025-11-21</a:t>
             </a:fld>
             <a:endParaRPr lang="en-CA"/>
           </a:p>
@@ -1574,7 +1544,7 @@
           <a:p>
             <a:fld id="{9729713E-BAEA-4825-AD9D-6B7A7DA27DCC}" type="datetimeFigureOut">
               <a:rPr lang="en-CA" smtClean="0"/>
-              <a:t>2025-11-20</a:t>
+              <a:t>2025-11-21</a:t>
             </a:fld>
             <a:endParaRPr lang="en-CA"/>
           </a:p>
@@ -1842,7 +1812,7 @@
           <a:p>
             <a:fld id="{9729713E-BAEA-4825-AD9D-6B7A7DA27DCC}" type="datetimeFigureOut">
               <a:rPr lang="en-CA" smtClean="0"/>
-              <a:t>2025-11-20</a:t>
+              <a:t>2025-11-21</a:t>
             </a:fld>
             <a:endParaRPr lang="en-CA"/>
           </a:p>
@@ -2257,7 +2227,7 @@
           <a:p>
             <a:fld id="{9729713E-BAEA-4825-AD9D-6B7A7DA27DCC}" type="datetimeFigureOut">
               <a:rPr lang="en-CA" smtClean="0"/>
-              <a:t>2025-11-20</a:t>
+              <a:t>2025-11-21</a:t>
             </a:fld>
             <a:endParaRPr lang="en-CA"/>
           </a:p>
@@ -2399,7 +2369,7 @@
           <a:p>
             <a:fld id="{9729713E-BAEA-4825-AD9D-6B7A7DA27DCC}" type="datetimeFigureOut">
               <a:rPr lang="en-CA" smtClean="0"/>
-              <a:t>2025-11-20</a:t>
+              <a:t>2025-11-21</a:t>
             </a:fld>
             <a:endParaRPr lang="en-CA"/>
           </a:p>
@@ -2512,7 +2482,7 @@
           <a:p>
             <a:fld id="{9729713E-BAEA-4825-AD9D-6B7A7DA27DCC}" type="datetimeFigureOut">
               <a:rPr lang="en-CA" smtClean="0"/>
-              <a:t>2025-11-20</a:t>
+              <a:t>2025-11-21</a:t>
             </a:fld>
             <a:endParaRPr lang="en-CA"/>
           </a:p>
@@ -2825,7 +2795,7 @@
           <a:p>
             <a:fld id="{9729713E-BAEA-4825-AD9D-6B7A7DA27DCC}" type="datetimeFigureOut">
               <a:rPr lang="en-CA" smtClean="0"/>
-              <a:t>2025-11-20</a:t>
+              <a:t>2025-11-21</a:t>
             </a:fld>
             <a:endParaRPr lang="en-CA"/>
           </a:p>
@@ -3114,7 +3084,7 @@
           <a:p>
             <a:fld id="{9729713E-BAEA-4825-AD9D-6B7A7DA27DCC}" type="datetimeFigureOut">
               <a:rPr lang="en-CA" smtClean="0"/>
-              <a:t>2025-11-20</a:t>
+              <a:t>2025-11-21</a:t>
             </a:fld>
             <a:endParaRPr lang="en-CA"/>
           </a:p>
@@ -3357,7 +3327,7 @@
           <a:p>
             <a:fld id="{9729713E-BAEA-4825-AD9D-6B7A7DA27DCC}" type="datetimeFigureOut">
               <a:rPr lang="en-CA" smtClean="0"/>
-              <a:t>2025-11-20</a:t>
+              <a:t>2025-11-21</a:t>
             </a:fld>
             <a:endParaRPr lang="en-CA"/>
           </a:p>
@@ -3913,54 +3883,19 @@
           <a:chExt cx="0" cy="0"/>
         </a:xfrm>
       </p:grpSpPr>
-      <p:sp>
-        <p:nvSpPr>
-          <p:cNvPr id="2" name="Title 1">
-            <a:extLst>
-              <a:ext uri="{FF2B5EF4-FFF2-40B4-BE49-F238E27FC236}">
-                <a16:creationId xmlns:a16="http://schemas.microsoft.com/office/drawing/2014/main" id="{5E0056DF-BB73-0CBB-1B4C-7320E10BCA7B}"/>
-              </a:ext>
-            </a:extLst>
-          </p:cNvPr>
-          <p:cNvSpPr>
-            <a:spLocks noGrp="1"/>
-          </p:cNvSpPr>
-          <p:nvPr>
-            <p:ph type="title"/>
-          </p:nvPr>
-        </p:nvSpPr>
-        <p:spPr/>
-        <p:txBody>
-          <a:bodyPr/>
-          <a:lstStyle/>
-          <a:p>
-            <a:r>
-              <a:rPr lang="en-CA" dirty="0"/>
-              <a:t>Silicon – Newtonian – 60,000 </a:t>
-            </a:r>
-            <a:r>
-              <a:rPr lang="en-CA" dirty="0" err="1"/>
-              <a:t>cP</a:t>
-            </a:r>
-            <a:endParaRPr lang="en-CA" dirty="0"/>
-          </a:p>
-        </p:txBody>
-      </p:sp>
       <p:pic>
         <p:nvPicPr>
-          <p:cNvPr id="5" name="Content Placeholder 4" descr="A diagram of a diagram&#10;&#10;AI-generated content may be incorrect.">
-            <a:extLst>
-              <a:ext uri="{FF2B5EF4-FFF2-40B4-BE49-F238E27FC236}">
-                <a16:creationId xmlns:a16="http://schemas.microsoft.com/office/drawing/2014/main" id="{4662F9F4-A3EC-EE28-9835-78E3A9E58469}"/>
+          <p:cNvPr id="16" name="Picture 15" descr="A group of graphs with different colored dots&#10;&#10;AI-generated content may be incorrect.">
+            <a:extLst>
+              <a:ext uri="{FF2B5EF4-FFF2-40B4-BE49-F238E27FC236}">
+                <a16:creationId xmlns:a16="http://schemas.microsoft.com/office/drawing/2014/main" id="{647931B0-9085-6211-DD5A-DC3C161BF647}"/>
               </a:ext>
             </a:extLst>
           </p:cNvPr>
           <p:cNvPicPr>
-            <a:picLocks noGrp="1" noChangeAspect="1"/>
+            <a:picLocks noChangeAspect="1"/>
           </p:cNvPicPr>
-          <p:nvPr>
-            <p:ph idx="1"/>
-          </p:nvPr>
+          <p:nvPr/>
         </p:nvPicPr>
         <p:blipFill>
           <a:blip r:embed="rId2">
@@ -3976,41 +3911,8 @@
         </p:blipFill>
         <p:spPr>
           <a:xfrm>
-            <a:off x="8168640" y="2813334"/>
-            <a:ext cx="4023360" cy="2396117"/>
-          </a:xfrm>
-        </p:spPr>
-      </p:pic>
-      <p:pic>
-        <p:nvPicPr>
-          <p:cNvPr id="7" name="Picture 6" descr="A group of graphs with different colored lines&#10;&#10;AI-generated content may be incorrect.">
-            <a:extLst>
-              <a:ext uri="{FF2B5EF4-FFF2-40B4-BE49-F238E27FC236}">
-                <a16:creationId xmlns:a16="http://schemas.microsoft.com/office/drawing/2014/main" id="{0F351E02-5974-48BC-FF4D-A1CFBDA09788}"/>
-              </a:ext>
-            </a:extLst>
-          </p:cNvPr>
-          <p:cNvPicPr>
-            <a:picLocks noChangeAspect="1"/>
-          </p:cNvPicPr>
-          <p:nvPr/>
-        </p:nvPicPr>
-        <p:blipFill>
-          <a:blip r:embed="rId3">
-            <a:extLst>
-              <a:ext uri="{28A0092B-C50C-407E-A947-70E740481C1C}">
-                <a14:useLocalDpi xmlns:a14="http://schemas.microsoft.com/office/drawing/2010/main" val="0"/>
-              </a:ext>
-            </a:extLst>
-          </a:blip>
-          <a:stretch>
-            <a:fillRect/>
-          </a:stretch>
-        </p:blipFill>
-        <p:spPr>
-          <a:xfrm>
-            <a:off x="4084320" y="2687781"/>
-            <a:ext cx="4023360" cy="2670540"/>
+            <a:off x="0" y="2676122"/>
+            <a:ext cx="4023360" cy="2670539"/>
           </a:xfrm>
           <a:prstGeom prst="rect">
             <a:avLst/>
@@ -4019,10 +3921,46 @@
       </p:pic>
       <p:pic>
         <p:nvPicPr>
-          <p:cNvPr id="9" name="Picture 8" descr="A group of graphs showing different sizes of data&#10;&#10;AI-generated content may be incorrect.">
-            <a:extLst>
-              <a:ext uri="{FF2B5EF4-FFF2-40B4-BE49-F238E27FC236}">
-                <a16:creationId xmlns:a16="http://schemas.microsoft.com/office/drawing/2014/main" id="{780A7C50-3254-4F23-CBDA-7BB14F1D88C0}"/>
+          <p:cNvPr id="13" name="Picture 12" descr="A group of graphs with different colored lines&#10;&#10;AI-generated content may be incorrect.">
+            <a:extLst>
+              <a:ext uri="{FF2B5EF4-FFF2-40B4-BE49-F238E27FC236}">
+                <a16:creationId xmlns:a16="http://schemas.microsoft.com/office/drawing/2014/main" id="{9115A0B2-0A15-AFE2-5BB9-13FBDC850BAA}"/>
+              </a:ext>
+            </a:extLst>
+          </p:cNvPr>
+          <p:cNvPicPr>
+            <a:picLocks noChangeAspect="1"/>
+          </p:cNvPicPr>
+          <p:nvPr/>
+        </p:nvPicPr>
+        <p:blipFill>
+          <a:blip r:embed="rId3">
+            <a:extLst>
+              <a:ext uri="{28A0092B-C50C-407E-A947-70E740481C1C}">
+                <a14:useLocalDpi xmlns:a14="http://schemas.microsoft.com/office/drawing/2010/main" val="0"/>
+              </a:ext>
+            </a:extLst>
+          </a:blip>
+          <a:stretch>
+            <a:fillRect/>
+          </a:stretch>
+        </p:blipFill>
+        <p:spPr>
+          <a:xfrm>
+            <a:off x="4084320" y="2687780"/>
+            <a:ext cx="4023360" cy="2670539"/>
+          </a:xfrm>
+          <a:prstGeom prst="rect">
+            <a:avLst/>
+          </a:prstGeom>
+        </p:spPr>
+      </p:pic>
+      <p:pic>
+        <p:nvPicPr>
+          <p:cNvPr id="6" name="Picture 5" descr="A diagram of a diagram&#10;&#10;AI-generated content may be incorrect.">
+            <a:extLst>
+              <a:ext uri="{FF2B5EF4-FFF2-40B4-BE49-F238E27FC236}">
+                <a16:creationId xmlns:a16="http://schemas.microsoft.com/office/drawing/2014/main" id="{77DD6CE5-15BD-5030-1669-E47F48656C08}"/>
               </a:ext>
             </a:extLst>
           </p:cNvPr>
@@ -4045,14 +3983,47 @@
         </p:blipFill>
         <p:spPr>
           <a:xfrm>
-            <a:off x="0" y="2687781"/>
-            <a:ext cx="4023360" cy="2672332"/>
+            <a:off x="8168640" y="2813333"/>
+            <a:ext cx="4023360" cy="2396116"/>
           </a:xfrm>
           <a:prstGeom prst="rect">
             <a:avLst/>
           </a:prstGeom>
         </p:spPr>
       </p:pic>
+      <p:sp>
+        <p:nvSpPr>
+          <p:cNvPr id="2" name="Title 1">
+            <a:extLst>
+              <a:ext uri="{FF2B5EF4-FFF2-40B4-BE49-F238E27FC236}">
+                <a16:creationId xmlns:a16="http://schemas.microsoft.com/office/drawing/2014/main" id="{5E0056DF-BB73-0CBB-1B4C-7320E10BCA7B}"/>
+              </a:ext>
+            </a:extLst>
+          </p:cNvPr>
+          <p:cNvSpPr>
+            <a:spLocks noGrp="1"/>
+          </p:cNvSpPr>
+          <p:nvPr>
+            <p:ph type="title"/>
+          </p:nvPr>
+        </p:nvSpPr>
+        <p:spPr/>
+        <p:txBody>
+          <a:bodyPr/>
+          <a:lstStyle/>
+          <a:p>
+            <a:r>
+              <a:rPr lang="en-CA" dirty="0"/>
+              <a:t>Silicon – Newtonian – 30,000 </a:t>
+            </a:r>
+            <a:r>
+              <a:rPr lang="en-CA" dirty="0" err="1"/>
+              <a:t>cP</a:t>
+            </a:r>
+            <a:endParaRPr lang="en-CA" dirty="0"/>
+          </a:p>
+        </p:txBody>
+      </p:sp>
       <p:graphicFrame>
         <p:nvGraphicFramePr>
           <p:cNvPr id="10" name="Table 9">
@@ -4277,7 +4248,6 @@
           </p:cNvPr>
           <p:cNvCxnSpPr>
             <a:cxnSpLocks/>
-            <a:stCxn id="7" idx="0"/>
             <a:endCxn id="11" idx="1"/>
           </p:cNvCxnSpPr>
           <p:nvPr/>
@@ -4326,6 +4296,435 @@
 </file>
 
 <file path=ppt/slides/slide3.xml><?xml version="1.0" encoding="utf-8"?>
+<p:sld xmlns:a="http://schemas.openxmlformats.org/drawingml/2006/main" xmlns:r="http://schemas.openxmlformats.org/officeDocument/2006/relationships" xmlns:p="http://schemas.openxmlformats.org/presentationml/2006/main">
+  <p:cSld>
+    <p:spTree>
+      <p:nvGrpSpPr>
+        <p:cNvPr id="1" name="">
+          <a:extLst>
+            <a:ext uri="{FF2B5EF4-FFF2-40B4-BE49-F238E27FC236}">
+              <a16:creationId xmlns:a16="http://schemas.microsoft.com/office/drawing/2014/main" id="{1B951FA9-D89F-9B8C-70C6-AC6DB6D7EBFE}"/>
+            </a:ext>
+          </a:extLst>
+        </p:cNvPr>
+        <p:cNvGrpSpPr/>
+        <p:nvPr/>
+      </p:nvGrpSpPr>
+      <p:grpSpPr>
+        <a:xfrm>
+          <a:off x="0" y="0"/>
+          <a:ext cx="0" cy="0"/>
+          <a:chOff x="0" y="0"/>
+          <a:chExt cx="0" cy="0"/>
+        </a:xfrm>
+      </p:grpSpPr>
+      <p:sp>
+        <p:nvSpPr>
+          <p:cNvPr id="2" name="Title 1">
+            <a:extLst>
+              <a:ext uri="{FF2B5EF4-FFF2-40B4-BE49-F238E27FC236}">
+                <a16:creationId xmlns:a16="http://schemas.microsoft.com/office/drawing/2014/main" id="{08F95F0D-27DB-A303-EBE9-6E994D9EA139}"/>
+              </a:ext>
+            </a:extLst>
+          </p:cNvPr>
+          <p:cNvSpPr>
+            <a:spLocks noGrp="1"/>
+          </p:cNvSpPr>
+          <p:nvPr>
+            <p:ph type="title"/>
+          </p:nvPr>
+        </p:nvSpPr>
+        <p:spPr/>
+        <p:txBody>
+          <a:bodyPr/>
+          <a:lstStyle/>
+          <a:p>
+            <a:r>
+              <a:rPr lang="en-CA" dirty="0"/>
+              <a:t>Silicon – Newtonian – 60,000 </a:t>
+            </a:r>
+            <a:r>
+              <a:rPr lang="en-CA" dirty="0" err="1"/>
+              <a:t>cP</a:t>
+            </a:r>
+            <a:endParaRPr lang="en-CA" dirty="0"/>
+          </a:p>
+        </p:txBody>
+      </p:sp>
+      <p:pic>
+        <p:nvPicPr>
+          <p:cNvPr id="5" name="Content Placeholder 4" descr="A diagram of a diagram&#10;&#10;AI-generated content may be incorrect.">
+            <a:extLst>
+              <a:ext uri="{FF2B5EF4-FFF2-40B4-BE49-F238E27FC236}">
+                <a16:creationId xmlns:a16="http://schemas.microsoft.com/office/drawing/2014/main" id="{1CA65E6F-1148-8CB5-8AA8-520E4F992C09}"/>
+              </a:ext>
+            </a:extLst>
+          </p:cNvPr>
+          <p:cNvPicPr>
+            <a:picLocks noGrp="1" noChangeAspect="1"/>
+          </p:cNvPicPr>
+          <p:nvPr>
+            <p:ph idx="1"/>
+          </p:nvPr>
+        </p:nvPicPr>
+        <p:blipFill>
+          <a:blip r:embed="rId2">
+            <a:extLst>
+              <a:ext uri="{28A0092B-C50C-407E-A947-70E740481C1C}">
+                <a14:useLocalDpi xmlns:a14="http://schemas.microsoft.com/office/drawing/2010/main" val="0"/>
+              </a:ext>
+            </a:extLst>
+          </a:blip>
+          <a:stretch>
+            <a:fillRect/>
+          </a:stretch>
+        </p:blipFill>
+        <p:spPr>
+          <a:xfrm>
+            <a:off x="8168640" y="2813334"/>
+            <a:ext cx="4023360" cy="2396117"/>
+          </a:xfrm>
+        </p:spPr>
+      </p:pic>
+      <p:pic>
+        <p:nvPicPr>
+          <p:cNvPr id="7" name="Picture 6" descr="A group of graphs with different colored lines&#10;&#10;AI-generated content may be incorrect.">
+            <a:extLst>
+              <a:ext uri="{FF2B5EF4-FFF2-40B4-BE49-F238E27FC236}">
+                <a16:creationId xmlns:a16="http://schemas.microsoft.com/office/drawing/2014/main" id="{84F3D55B-0A39-958C-52AF-C8B7BA45629F}"/>
+              </a:ext>
+            </a:extLst>
+          </p:cNvPr>
+          <p:cNvPicPr>
+            <a:picLocks noChangeAspect="1"/>
+          </p:cNvPicPr>
+          <p:nvPr/>
+        </p:nvPicPr>
+        <p:blipFill>
+          <a:blip r:embed="rId3">
+            <a:extLst>
+              <a:ext uri="{28A0092B-C50C-407E-A947-70E740481C1C}">
+                <a14:useLocalDpi xmlns:a14="http://schemas.microsoft.com/office/drawing/2010/main" val="0"/>
+              </a:ext>
+            </a:extLst>
+          </a:blip>
+          <a:stretch>
+            <a:fillRect/>
+          </a:stretch>
+        </p:blipFill>
+        <p:spPr>
+          <a:xfrm>
+            <a:off x="4084320" y="2687781"/>
+            <a:ext cx="4023360" cy="2670540"/>
+          </a:xfrm>
+          <a:prstGeom prst="rect">
+            <a:avLst/>
+          </a:prstGeom>
+        </p:spPr>
+      </p:pic>
+      <p:pic>
+        <p:nvPicPr>
+          <p:cNvPr id="9" name="Picture 8" descr="A group of graphs showing different sizes of data&#10;&#10;AI-generated content may be incorrect.">
+            <a:extLst>
+              <a:ext uri="{FF2B5EF4-FFF2-40B4-BE49-F238E27FC236}">
+                <a16:creationId xmlns:a16="http://schemas.microsoft.com/office/drawing/2014/main" id="{12781D38-D05A-192A-21A3-CE8AAAE675ED}"/>
+              </a:ext>
+            </a:extLst>
+          </p:cNvPr>
+          <p:cNvPicPr>
+            <a:picLocks noChangeAspect="1"/>
+          </p:cNvPicPr>
+          <p:nvPr/>
+        </p:nvPicPr>
+        <p:blipFill>
+          <a:blip r:embed="rId4">
+            <a:extLst>
+              <a:ext uri="{28A0092B-C50C-407E-A947-70E740481C1C}">
+                <a14:useLocalDpi xmlns:a14="http://schemas.microsoft.com/office/drawing/2010/main" val="0"/>
+              </a:ext>
+            </a:extLst>
+          </a:blip>
+          <a:stretch>
+            <a:fillRect/>
+          </a:stretch>
+        </p:blipFill>
+        <p:spPr>
+          <a:xfrm>
+            <a:off x="0" y="2687781"/>
+            <a:ext cx="4023360" cy="2672332"/>
+          </a:xfrm>
+          <a:prstGeom prst="rect">
+            <a:avLst/>
+          </a:prstGeom>
+        </p:spPr>
+      </p:pic>
+      <p:graphicFrame>
+        <p:nvGraphicFramePr>
+          <p:cNvPr id="10" name="Table 9">
+            <a:extLst>
+              <a:ext uri="{FF2B5EF4-FFF2-40B4-BE49-F238E27FC236}">
+                <a16:creationId xmlns:a16="http://schemas.microsoft.com/office/drawing/2014/main" id="{8D7C81B6-EE2F-8DF6-AD88-EFB4519EFF3D}"/>
+              </a:ext>
+            </a:extLst>
+          </p:cNvPr>
+          <p:cNvGraphicFramePr>
+            <a:graphicFrameLocks noGrp="1"/>
+          </p:cNvGraphicFramePr>
+          <p:nvPr/>
+        </p:nvGraphicFramePr>
+        <p:xfrm>
+          <a:off x="90790" y="2165845"/>
+          <a:ext cx="12010419" cy="370840"/>
+        </p:xfrm>
+        <a:graphic>
+          <a:graphicData uri="http://schemas.openxmlformats.org/drawingml/2006/table">
+            <a:tbl>
+              <a:tblPr firstRow="1" bandRow="1">
+                <a:tableStyleId>{5C22544A-7EE6-4342-B048-85BDC9FD1C3A}</a:tableStyleId>
+              </a:tblPr>
+              <a:tblGrid>
+                <a:gridCol w="4003473">
+                  <a:extLst>
+                    <a:ext uri="{9D8B030D-6E8A-4147-A177-3AD203B41FA5}">
+                      <a16:colId xmlns:a16="http://schemas.microsoft.com/office/drawing/2014/main" val="1095192394"/>
+                    </a:ext>
+                  </a:extLst>
+                </a:gridCol>
+                <a:gridCol w="4003473">
+                  <a:extLst>
+                    <a:ext uri="{9D8B030D-6E8A-4147-A177-3AD203B41FA5}">
+                      <a16:colId xmlns:a16="http://schemas.microsoft.com/office/drawing/2014/main" val="1335469729"/>
+                    </a:ext>
+                  </a:extLst>
+                </a:gridCol>
+                <a:gridCol w="4003473">
+                  <a:extLst>
+                    <a:ext uri="{9D8B030D-6E8A-4147-A177-3AD203B41FA5}">
+                      <a16:colId xmlns:a16="http://schemas.microsoft.com/office/drawing/2014/main" val="755195660"/>
+                    </a:ext>
+                  </a:extLst>
+                </a:gridCol>
+              </a:tblGrid>
+              <a:tr h="370840">
+                <a:tc>
+                  <a:txBody>
+                    <a:bodyPr/>
+                    <a:lstStyle/>
+                    <a:p>
+                      <a:pPr algn="ctr"/>
+                      <a:r>
+                        <a:rPr lang="en-CA" dirty="0"/>
+                        <a:t>Raw Data of Torque(%)-Spees (rpm)</a:t>
+                      </a:r>
+                    </a:p>
+                  </a:txBody>
+                  <a:tcPr/>
+                </a:tc>
+                <a:tc>
+                  <a:txBody>
+                    <a:bodyPr/>
+                    <a:lstStyle/>
+                    <a:p>
+                      <a:pPr algn="ctr"/>
+                      <a:r>
+                        <a:rPr lang="en-CA" dirty="0"/>
+                        <a:t>Fitted Curve on Stress-Strain</a:t>
+                      </a:r>
+                    </a:p>
+                  </a:txBody>
+                  <a:tcPr/>
+                </a:tc>
+                <a:tc>
+                  <a:txBody>
+                    <a:bodyPr/>
+                    <a:lstStyle/>
+                    <a:p>
+                      <a:pPr algn="ctr"/>
+                      <a:r>
+                        <a:rPr lang="en-CA" dirty="0"/>
+                        <a:t>Calculated Viscosity (</a:t>
+                      </a:r>
+                      <a:r>
+                        <a:rPr lang="en-CA" dirty="0" err="1"/>
+                        <a:t>cP</a:t>
+                      </a:r>
+                      <a:r>
+                        <a:rPr lang="en-CA" dirty="0"/>
+                        <a:t>)</a:t>
+                      </a:r>
+                    </a:p>
+                  </a:txBody>
+                  <a:tcPr/>
+                </a:tc>
+                <a:extLst>
+                  <a:ext uri="{0D108BD9-81ED-4DB2-BD59-A6C34878D82A}">
+                    <a16:rowId xmlns:a16="http://schemas.microsoft.com/office/drawing/2014/main" val="2348236010"/>
+                  </a:ext>
+                </a:extLst>
+              </a:tr>
+            </a:tbl>
+          </a:graphicData>
+        </a:graphic>
+      </p:graphicFrame>
+      <p:pic>
+        <p:nvPicPr>
+          <p:cNvPr id="11" name="Picture 2" descr="1 Flow curves (shear stress vs shear rate) for different types of flow... |  Download Scientific Diagram">
+            <a:extLst>
+              <a:ext uri="{FF2B5EF4-FFF2-40B4-BE49-F238E27FC236}">
+                <a16:creationId xmlns:a16="http://schemas.microsoft.com/office/drawing/2014/main" id="{69EF164E-085C-646C-180E-73484CF08F0A}"/>
+              </a:ext>
+            </a:extLst>
+          </p:cNvPr>
+          <p:cNvPicPr>
+            <a:picLocks noChangeAspect="1" noChangeArrowheads="1"/>
+          </p:cNvPicPr>
+          <p:nvPr/>
+        </p:nvPicPr>
+        <p:blipFill>
+          <a:blip r:embed="rId5">
+            <a:extLst>
+              <a:ext uri="{28A0092B-C50C-407E-A947-70E740481C1C}">
+                <a14:useLocalDpi xmlns:a14="http://schemas.microsoft.com/office/drawing/2010/main" val="0"/>
+              </a:ext>
+            </a:extLst>
+          </a:blip>
+          <a:srcRect/>
+          <a:stretch>
+            <a:fillRect/>
+          </a:stretch>
+        </p:blipFill>
+        <p:spPr bwMode="auto">
+          <a:xfrm>
+            <a:off x="8828901" y="82694"/>
+            <a:ext cx="2646986" cy="2011995"/>
+          </a:xfrm>
+          <a:prstGeom prst="rect">
+            <a:avLst/>
+          </a:prstGeom>
+          <a:noFill/>
+          <a:extLst>
+            <a:ext uri="{909E8E84-426E-40DD-AFC4-6F175D3DCCD1}">
+              <a14:hiddenFill xmlns:a14="http://schemas.microsoft.com/office/drawing/2010/main">
+                <a:solidFill>
+                  <a:srgbClr val="FFFFFF"/>
+                </a:solidFill>
+              </a14:hiddenFill>
+            </a:ext>
+          </a:extLst>
+        </p:spPr>
+      </p:pic>
+      <p:sp>
+        <p:nvSpPr>
+          <p:cNvPr id="12" name="Oval 11">
+            <a:extLst>
+              <a:ext uri="{FF2B5EF4-FFF2-40B4-BE49-F238E27FC236}">
+                <a16:creationId xmlns:a16="http://schemas.microsoft.com/office/drawing/2014/main" id="{4C1CBFB4-00F7-3347-D7E9-D7383B25B6E3}"/>
+              </a:ext>
+            </a:extLst>
+          </p:cNvPr>
+          <p:cNvSpPr/>
+          <p:nvPr/>
+        </p:nvSpPr>
+        <p:spPr>
+          <a:xfrm>
+            <a:off x="10252953" y="1088691"/>
+            <a:ext cx="778213" cy="338032"/>
+          </a:xfrm>
+          <a:prstGeom prst="ellipse">
+            <a:avLst/>
+          </a:prstGeom>
+          <a:solidFill>
+            <a:schemeClr val="accent6">
+              <a:alpha val="50000"/>
+            </a:schemeClr>
+          </a:solidFill>
+          <a:ln>
+            <a:noFill/>
+          </a:ln>
+        </p:spPr>
+        <p:style>
+          <a:lnRef idx="0">
+            <a:scrgbClr r="0" g="0" b="0"/>
+          </a:lnRef>
+          <a:fillRef idx="0">
+            <a:scrgbClr r="0" g="0" b="0"/>
+          </a:fillRef>
+          <a:effectRef idx="0">
+            <a:scrgbClr r="0" g="0" b="0"/>
+          </a:effectRef>
+          <a:fontRef idx="minor">
+            <a:schemeClr val="lt1"/>
+          </a:fontRef>
+        </p:style>
+        <p:txBody>
+          <a:bodyPr rtlCol="0" anchor="ctr"/>
+          <a:lstStyle/>
+          <a:p>
+            <a:pPr algn="ctr"/>
+            <a:endParaRPr lang="en-CA"/>
+          </a:p>
+        </p:txBody>
+      </p:sp>
+      <p:cxnSp>
+        <p:nvCxnSpPr>
+          <p:cNvPr id="14" name="Connector: Curved 13">
+            <a:extLst>
+              <a:ext uri="{FF2B5EF4-FFF2-40B4-BE49-F238E27FC236}">
+                <a16:creationId xmlns:a16="http://schemas.microsoft.com/office/drawing/2014/main" id="{21C3E273-094A-8F4E-4474-125C1A3A0946}"/>
+              </a:ext>
+            </a:extLst>
+          </p:cNvPr>
+          <p:cNvCxnSpPr>
+            <a:cxnSpLocks/>
+            <a:stCxn id="7" idx="0"/>
+            <a:endCxn id="11" idx="1"/>
+          </p:cNvCxnSpPr>
+          <p:nvPr/>
+        </p:nvCxnSpPr>
+        <p:spPr>
+          <a:xfrm rot="5400000" flipH="1" flipV="1">
+            <a:off x="6662906" y="521787"/>
+            <a:ext cx="1599089" cy="2732901"/>
+          </a:xfrm>
+          <a:prstGeom prst="curvedConnector2">
+            <a:avLst/>
+          </a:prstGeom>
+          <a:ln>
+            <a:solidFill>
+              <a:srgbClr val="00B0F0"/>
+            </a:solidFill>
+            <a:tailEnd type="triangle"/>
+          </a:ln>
+        </p:spPr>
+        <p:style>
+          <a:lnRef idx="2">
+            <a:schemeClr val="accent1"/>
+          </a:lnRef>
+          <a:fillRef idx="0">
+            <a:schemeClr val="accent1"/>
+          </a:fillRef>
+          <a:effectRef idx="1">
+            <a:schemeClr val="accent1"/>
+          </a:effectRef>
+          <a:fontRef idx="minor">
+            <a:schemeClr val="tx1"/>
+          </a:fontRef>
+        </p:style>
+      </p:cxnSp>
+    </p:spTree>
+    <p:extLst>
+      <p:ext uri="{BB962C8B-B14F-4D97-AF65-F5344CB8AC3E}">
+        <p14:creationId xmlns:p14="http://schemas.microsoft.com/office/powerpoint/2010/main" val="4206293272"/>
+      </p:ext>
+    </p:extLst>
+  </p:cSld>
+  <p:clrMapOvr>
+    <a:masterClrMapping/>
+  </p:clrMapOvr>
+</p:sld>
+</file>
+
+<file path=ppt/slides/slide4.xml><?xml version="1.0" encoding="utf-8"?>
 <p:sld xmlns:a="http://schemas.openxmlformats.org/drawingml/2006/main" xmlns:r="http://schemas.openxmlformats.org/officeDocument/2006/relationships" xmlns:p="http://schemas.openxmlformats.org/presentationml/2006/main">
   <p:cSld>
     <p:spTree>
@@ -4755,7 +5154,7 @@
 </p:sld>
 </file>
 
-<file path=ppt/slides/slide4.xml><?xml version="1.0" encoding="utf-8"?>
+<file path=ppt/slides/slide5.xml><?xml version="1.0" encoding="utf-8"?>
 <p:sld xmlns:a="http://schemas.openxmlformats.org/drawingml/2006/main" xmlns:r="http://schemas.openxmlformats.org/officeDocument/2006/relationships" xmlns:p="http://schemas.openxmlformats.org/presentationml/2006/main">
   <p:cSld>
     <p:spTree>
@@ -5222,6 +5621,204 @@
     <p:extLst>
       <p:ext uri="{BB962C8B-B14F-4D97-AF65-F5344CB8AC3E}">
         <p14:creationId xmlns:p14="http://schemas.microsoft.com/office/powerpoint/2010/main" val="4196977327"/>
+      </p:ext>
+    </p:extLst>
+  </p:cSld>
+  <p:clrMapOvr>
+    <a:masterClrMapping/>
+  </p:clrMapOvr>
+</p:sld>
+</file>
+
+<file path=ppt/slides/slide6.xml><?xml version="1.0" encoding="utf-8"?>
+<p:sld xmlns:a="http://schemas.openxmlformats.org/drawingml/2006/main" xmlns:r="http://schemas.openxmlformats.org/officeDocument/2006/relationships" xmlns:p="http://schemas.openxmlformats.org/presentationml/2006/main">
+  <p:cSld>
+    <p:spTree>
+      <p:nvGrpSpPr>
+        <p:cNvPr id="1" name=""/>
+        <p:cNvGrpSpPr/>
+        <p:nvPr/>
+      </p:nvGrpSpPr>
+      <p:grpSpPr>
+        <a:xfrm>
+          <a:off x="0" y="0"/>
+          <a:ext cx="0" cy="0"/>
+          <a:chOff x="0" y="0"/>
+          <a:chExt cx="0" cy="0"/>
+        </a:xfrm>
+      </p:grpSpPr>
+      <p:pic>
+        <p:nvPicPr>
+          <p:cNvPr id="3" name="Picture 2" descr="A group of graphs with numbers and letters&#10;&#10;AI-generated content may be incorrect.">
+            <a:extLst>
+              <a:ext uri="{FF2B5EF4-FFF2-40B4-BE49-F238E27FC236}">
+                <a16:creationId xmlns:a16="http://schemas.microsoft.com/office/drawing/2014/main" id="{5B92C276-54C5-E80A-F87D-241D3B27CD77}"/>
+              </a:ext>
+            </a:extLst>
+          </p:cNvPr>
+          <p:cNvPicPr>
+            <a:picLocks noChangeAspect="1"/>
+          </p:cNvPicPr>
+          <p:nvPr/>
+        </p:nvPicPr>
+        <p:blipFill>
+          <a:blip r:embed="rId2">
+            <a:extLst>
+              <a:ext uri="{28A0092B-C50C-407E-A947-70E740481C1C}">
+                <a14:useLocalDpi xmlns:a14="http://schemas.microsoft.com/office/drawing/2010/main" val="0"/>
+              </a:ext>
+            </a:extLst>
+          </a:blip>
+          <a:stretch>
+            <a:fillRect/>
+          </a:stretch>
+        </p:blipFill>
+        <p:spPr>
+          <a:xfrm>
+            <a:off x="935182" y="0"/>
+            <a:ext cx="10321636" cy="6858000"/>
+          </a:xfrm>
+          <a:prstGeom prst="rect">
+            <a:avLst/>
+          </a:prstGeom>
+        </p:spPr>
+      </p:pic>
+    </p:spTree>
+    <p:extLst>
+      <p:ext uri="{BB962C8B-B14F-4D97-AF65-F5344CB8AC3E}">
+        <p14:creationId xmlns:p14="http://schemas.microsoft.com/office/powerpoint/2010/main" val="2860284634"/>
+      </p:ext>
+    </p:extLst>
+  </p:cSld>
+  <p:clrMapOvr>
+    <a:masterClrMapping/>
+  </p:clrMapOvr>
+</p:sld>
+</file>
+
+<file path=ppt/slides/slide7.xml><?xml version="1.0" encoding="utf-8"?>
+<p:sld xmlns:a="http://schemas.openxmlformats.org/drawingml/2006/main" xmlns:r="http://schemas.openxmlformats.org/officeDocument/2006/relationships" xmlns:p="http://schemas.openxmlformats.org/presentationml/2006/main">
+  <p:cSld>
+    <p:spTree>
+      <p:nvGrpSpPr>
+        <p:cNvPr id="1" name=""/>
+        <p:cNvGrpSpPr/>
+        <p:nvPr/>
+      </p:nvGrpSpPr>
+      <p:grpSpPr>
+        <a:xfrm>
+          <a:off x="0" y="0"/>
+          <a:ext cx="0" cy="0"/>
+          <a:chOff x="0" y="0"/>
+          <a:chExt cx="0" cy="0"/>
+        </a:xfrm>
+      </p:grpSpPr>
+      <p:pic>
+        <p:nvPicPr>
+          <p:cNvPr id="5" name="Picture 4" descr="A graph of a graph&#10;&#10;AI-generated content may be incorrect.">
+            <a:extLst>
+              <a:ext uri="{FF2B5EF4-FFF2-40B4-BE49-F238E27FC236}">
+                <a16:creationId xmlns:a16="http://schemas.microsoft.com/office/drawing/2014/main" id="{ED28A696-5168-9E09-2F29-888F3BD90146}"/>
+              </a:ext>
+            </a:extLst>
+          </p:cNvPr>
+          <p:cNvPicPr>
+            <a:picLocks noChangeAspect="1"/>
+          </p:cNvPicPr>
+          <p:nvPr/>
+        </p:nvPicPr>
+        <p:blipFill>
+          <a:blip r:embed="rId2">
+            <a:extLst>
+              <a:ext uri="{28A0092B-C50C-407E-A947-70E740481C1C}">
+                <a14:useLocalDpi xmlns:a14="http://schemas.microsoft.com/office/drawing/2010/main" val="0"/>
+              </a:ext>
+            </a:extLst>
+          </a:blip>
+          <a:stretch>
+            <a:fillRect/>
+          </a:stretch>
+        </p:blipFill>
+        <p:spPr>
+          <a:xfrm>
+            <a:off x="935182" y="0"/>
+            <a:ext cx="10321636" cy="6858000"/>
+          </a:xfrm>
+          <a:prstGeom prst="rect">
+            <a:avLst/>
+          </a:prstGeom>
+        </p:spPr>
+      </p:pic>
+    </p:spTree>
+    <p:extLst>
+      <p:ext uri="{BB962C8B-B14F-4D97-AF65-F5344CB8AC3E}">
+        <p14:creationId xmlns:p14="http://schemas.microsoft.com/office/powerpoint/2010/main" val="1581567201"/>
+      </p:ext>
+    </p:extLst>
+  </p:cSld>
+  <p:clrMapOvr>
+    <a:masterClrMapping/>
+  </p:clrMapOvr>
+</p:sld>
+</file>
+
+<file path=ppt/slides/slide8.xml><?xml version="1.0" encoding="utf-8"?>
+<p:sld xmlns:a="http://schemas.openxmlformats.org/drawingml/2006/main" xmlns:r="http://schemas.openxmlformats.org/officeDocument/2006/relationships" xmlns:p="http://schemas.openxmlformats.org/presentationml/2006/main">
+  <p:cSld>
+    <p:spTree>
+      <p:nvGrpSpPr>
+        <p:cNvPr id="1" name=""/>
+        <p:cNvGrpSpPr/>
+        <p:nvPr/>
+      </p:nvGrpSpPr>
+      <p:grpSpPr>
+        <a:xfrm>
+          <a:off x="0" y="0"/>
+          <a:ext cx="0" cy="0"/>
+          <a:chOff x="0" y="0"/>
+          <a:chExt cx="0" cy="0"/>
+        </a:xfrm>
+      </p:grpSpPr>
+      <p:pic>
+        <p:nvPicPr>
+          <p:cNvPr id="3" name="Picture 2" descr="A graph of a graph of a number of numbers&#10;&#10;AI-generated content may be incorrect.">
+            <a:extLst>
+              <a:ext uri="{FF2B5EF4-FFF2-40B4-BE49-F238E27FC236}">
+                <a16:creationId xmlns:a16="http://schemas.microsoft.com/office/drawing/2014/main" id="{E7E8E9C6-3334-D683-7FEA-A7E6C48B5ACD}"/>
+              </a:ext>
+            </a:extLst>
+          </p:cNvPr>
+          <p:cNvPicPr>
+            <a:picLocks noChangeAspect="1"/>
+          </p:cNvPicPr>
+          <p:nvPr/>
+        </p:nvPicPr>
+        <p:blipFill>
+          <a:blip r:embed="rId2">
+            <a:extLst>
+              <a:ext uri="{28A0092B-C50C-407E-A947-70E740481C1C}">
+                <a14:useLocalDpi xmlns:a14="http://schemas.microsoft.com/office/drawing/2010/main" val="0"/>
+              </a:ext>
+            </a:extLst>
+          </a:blip>
+          <a:stretch>
+            <a:fillRect/>
+          </a:stretch>
+        </p:blipFill>
+        <p:spPr>
+          <a:xfrm>
+            <a:off x="929963" y="0"/>
+            <a:ext cx="10332073" cy="6858000"/>
+          </a:xfrm>
+          <a:prstGeom prst="rect">
+            <a:avLst/>
+          </a:prstGeom>
+        </p:spPr>
+      </p:pic>
+    </p:spTree>
+    <p:extLst>
+      <p:ext uri="{BB962C8B-B14F-4D97-AF65-F5344CB8AC3E}">
+        <p14:creationId xmlns:p14="http://schemas.microsoft.com/office/powerpoint/2010/main" val="936181188"/>
       </p:ext>
     </p:extLst>
   </p:cSld>

</xml_diff>